<commit_message>
update the git file
</commit_message>
<xml_diff>
--- a/lesson1/git.pptx
+++ b/lesson1/git.pptx
@@ -5,12 +5,14 @@
     <p:sldMasterId id="2147483648" r:id="rId1"/>
   </p:sldMasterIdLst>
   <p:notesMasterIdLst>
-    <p:notesMasterId r:id="rId5"/>
+    <p:notesMasterId r:id="rId7"/>
   </p:notesMasterIdLst>
   <p:sldIdLst>
     <p:sldId id="256" r:id="rId2"/>
     <p:sldId id="257" r:id="rId3"/>
     <p:sldId id="258" r:id="rId4"/>
+    <p:sldId id="259" r:id="rId5"/>
+    <p:sldId id="260" r:id="rId6"/>
   </p:sldIdLst>
   <p:sldSz cx="9144000" cy="6858000" type="screen4x3"/>
   <p:notesSz cx="6858000" cy="9144000"/>
@@ -194,6 +196,7 @@
           <a:p>
             <a:fld id="{51BA14B7-031E-42BE-B200-05AAFEE5FCB8}" type="datetimeFigureOut">
               <a:rPr lang="zh-CN" altLang="en-US" smtClean="0"/>
+              <a:pPr/>
               <a:t>2015/4/7</a:t>
             </a:fld>
             <a:endParaRPr lang="zh-CN" altLang="en-US"/>
@@ -355,6 +358,7 @@
           <a:p>
             <a:fld id="{B8A78B7B-7F66-4CF1-9958-B594E579EEAD}" type="slidenum">
               <a:rPr lang="zh-CN" altLang="en-US" smtClean="0"/>
+              <a:pPr/>
               <a:t>‹#›</a:t>
             </a:fld>
             <a:endParaRPr lang="zh-CN" altLang="en-US"/>
@@ -526,6 +530,7 @@
           <a:p>
             <a:fld id="{B8A78B7B-7F66-4CF1-9958-B594E579EEAD}" type="slidenum">
               <a:rPr lang="zh-CN" altLang="en-US" smtClean="0"/>
+              <a:pPr/>
               <a:t>2</a:t>
             </a:fld>
             <a:endParaRPr lang="zh-CN" altLang="en-US"/>
@@ -3576,6 +3581,13 @@
   <p:clrMapOvr>
     <a:masterClrMapping/>
   </p:clrMapOvr>
+  <p:timing>
+    <p:tnLst>
+      <p:par>
+        <p:cTn id="1" dur="indefinite" restart="never" nodeType="tmRoot"/>
+      </p:par>
+    </p:tnLst>
+  </p:timing>
 </p:sld>
 </file>
 
@@ -3645,38 +3657,22 @@
             </a:r>
             <a:r>
               <a:rPr lang="en-US" altLang="zh-CN" dirty="0" smtClean="0"/>
-              <a:t> </a:t>
-            </a:r>
-            <a:r>
-              <a:rPr lang="en-US" altLang="zh-CN" dirty="0" smtClean="0"/>
-              <a:t>for </a:t>
-            </a:r>
-            <a:r>
-              <a:rPr lang="en-US" altLang="zh-CN" dirty="0" smtClean="0"/>
-              <a:t>windows</a:t>
+              <a:t> for windows</a:t>
             </a:r>
           </a:p>
           <a:p>
             <a:pPr lvl="1"/>
             <a:r>
               <a:rPr lang="zh-CN" altLang="en-US" dirty="0" smtClean="0"/>
-              <a:t>下</a:t>
-            </a:r>
+              <a:t>下载安装</a:t>
+            </a:r>
+            <a:endParaRPr lang="en-US" altLang="zh-CN" dirty="0" smtClean="0"/>
+          </a:p>
+          <a:p>
+            <a:pPr lvl="1"/>
             <a:r>
               <a:rPr lang="zh-CN" altLang="en-US" dirty="0" smtClean="0"/>
-              <a:t>载安装</a:t>
-            </a:r>
-            <a:endParaRPr lang="en-US" altLang="zh-CN" dirty="0" smtClean="0"/>
-          </a:p>
-          <a:p>
-            <a:pPr lvl="1"/>
-            <a:r>
-              <a:rPr lang="zh-CN" altLang="en-US" dirty="0" smtClean="0"/>
-              <a:t>配</a:t>
-            </a:r>
-            <a:r>
-              <a:rPr lang="zh-CN" altLang="en-US" dirty="0" smtClean="0"/>
-              <a:t>置环境变量</a:t>
+              <a:t>配置环境变量</a:t>
             </a:r>
             <a:endParaRPr lang="en-US" altLang="zh-CN" dirty="0" smtClean="0"/>
           </a:p>
@@ -3697,7 +3693,6 @@
               <a:rPr lang="en-US" altLang="zh-CN" dirty="0" smtClean="0"/>
               <a:t>http://github.com</a:t>
             </a:r>
-            <a:endParaRPr lang="en-US" altLang="zh-CN" dirty="0" smtClean="0"/>
           </a:p>
           <a:p>
             <a:endParaRPr lang="zh-CN" altLang="en-US" dirty="0"/>
@@ -3755,6 +3750,13 @@
   <p:clrMapOvr>
     <a:masterClrMapping/>
   </p:clrMapOvr>
+  <p:timing>
+    <p:tnLst>
+      <p:par>
+        <p:cTn id="1" dur="indefinite" restart="never" nodeType="tmRoot"/>
+      </p:par>
+    </p:tnLst>
+  </p:timing>
 </p:sld>
 </file>
 
@@ -3927,6 +3929,891 @@
   <p:clrMapOvr>
     <a:masterClrMapping/>
   </p:clrMapOvr>
+  <p:timing>
+    <p:tnLst>
+      <p:par>
+        <p:cTn id="1" dur="indefinite" restart="never" nodeType="tmRoot"/>
+      </p:par>
+    </p:tnLst>
+  </p:timing>
+</p:sld>
+</file>
+
+<file path=ppt/slides/slide4.xml><?xml version="1.0" encoding="utf-8"?>
+<p:sld xmlns:a="http://schemas.openxmlformats.org/drawingml/2006/main" xmlns:r="http://schemas.openxmlformats.org/officeDocument/2006/relationships" xmlns:p="http://schemas.openxmlformats.org/presentationml/2006/main">
+  <p:cSld>
+    <p:spTree>
+      <p:nvGrpSpPr>
+        <p:cNvPr id="1" name=""/>
+        <p:cNvGrpSpPr/>
+        <p:nvPr/>
+      </p:nvGrpSpPr>
+      <p:grpSpPr>
+        <a:xfrm>
+          <a:off x="0" y="0"/>
+          <a:ext cx="0" cy="0"/>
+          <a:chOff x="0" y="0"/>
+          <a:chExt cx="0" cy="0"/>
+        </a:xfrm>
+      </p:grpSpPr>
+      <p:sp>
+        <p:nvSpPr>
+          <p:cNvPr id="2" name="标题 1"/>
+          <p:cNvSpPr>
+            <a:spLocks noGrp="1"/>
+          </p:cNvSpPr>
+          <p:nvPr>
+            <p:ph type="title"/>
+          </p:nvPr>
+        </p:nvSpPr>
+        <p:spPr/>
+        <p:txBody>
+          <a:bodyPr/>
+          <a:lstStyle/>
+          <a:p>
+            <a:r>
+              <a:rPr lang="en-US" altLang="zh-CN" dirty="0" err="1" smtClean="0"/>
+              <a:t>git</a:t>
+            </a:r>
+            <a:endParaRPr lang="zh-CN" altLang="en-US" dirty="0"/>
+          </a:p>
+        </p:txBody>
+      </p:sp>
+      <p:sp>
+        <p:nvSpPr>
+          <p:cNvPr id="4" name="日期占位符 3"/>
+          <p:cNvSpPr>
+            <a:spLocks noGrp="1"/>
+          </p:cNvSpPr>
+          <p:nvPr>
+            <p:ph type="dt" sz="half" idx="10"/>
+          </p:nvPr>
+        </p:nvSpPr>
+        <p:spPr/>
+        <p:txBody>
+          <a:bodyPr/>
+          <a:lstStyle/>
+          <a:p>
+            <a:r>
+              <a:rPr lang="en-US" altLang="zh-CN" smtClean="0"/>
+              <a:t>2015/4/7</a:t>
+            </a:r>
+            <a:endParaRPr lang="zh-CN" altLang="en-US"/>
+          </a:p>
+        </p:txBody>
+      </p:sp>
+      <p:sp>
+        <p:nvSpPr>
+          <p:cNvPr id="5" name="页脚占位符 4"/>
+          <p:cNvSpPr>
+            <a:spLocks noGrp="1"/>
+          </p:cNvSpPr>
+          <p:nvPr>
+            <p:ph type="ftr" sz="quarter" idx="11"/>
+          </p:nvPr>
+        </p:nvSpPr>
+        <p:spPr/>
+        <p:txBody>
+          <a:bodyPr/>
+          <a:lstStyle/>
+          <a:p>
+            <a:r>
+              <a:rPr lang="zh-CN" altLang="en-US" smtClean="0"/>
+              <a:t>朱涛</a:t>
+            </a:r>
+            <a:endParaRPr lang="zh-CN" altLang="en-US"/>
+          </a:p>
+        </p:txBody>
+      </p:sp>
+      <p:sp>
+        <p:nvSpPr>
+          <p:cNvPr id="6" name="圆角矩形 5"/>
+          <p:cNvSpPr/>
+          <p:nvPr/>
+        </p:nvSpPr>
+        <p:spPr>
+          <a:xfrm>
+            <a:off x="3347864" y="1772816"/>
+            <a:ext cx="2160240" cy="1368152"/>
+          </a:xfrm>
+          <a:prstGeom prst="roundRect">
+            <a:avLst/>
+          </a:prstGeom>
+        </p:spPr>
+        <p:style>
+          <a:lnRef idx="2">
+            <a:schemeClr val="accent1">
+              <a:shade val="50000"/>
+            </a:schemeClr>
+          </a:lnRef>
+          <a:fillRef idx="1">
+            <a:schemeClr val="accent1"/>
+          </a:fillRef>
+          <a:effectRef idx="0">
+            <a:schemeClr val="accent1"/>
+          </a:effectRef>
+          <a:fontRef idx="minor">
+            <a:schemeClr val="lt1"/>
+          </a:fontRef>
+        </p:style>
+        <p:txBody>
+          <a:bodyPr rtlCol="0" anchor="ctr"/>
+          <a:lstStyle/>
+          <a:p>
+            <a:pPr algn="ctr"/>
+            <a:r>
+              <a:rPr lang="zh-CN" altLang="en-US" dirty="0" smtClean="0"/>
+              <a:t>代码服务器</a:t>
+            </a:r>
+            <a:endParaRPr lang="zh-CN" altLang="en-US" dirty="0"/>
+          </a:p>
+        </p:txBody>
+      </p:sp>
+      <p:sp>
+        <p:nvSpPr>
+          <p:cNvPr id="7" name="笑脸 6"/>
+          <p:cNvSpPr/>
+          <p:nvPr/>
+        </p:nvSpPr>
+        <p:spPr>
+          <a:xfrm>
+            <a:off x="1331640" y="4509120"/>
+            <a:ext cx="1728192" cy="1440160"/>
+          </a:xfrm>
+          <a:prstGeom prst="smileyFace">
+            <a:avLst/>
+          </a:prstGeom>
+        </p:spPr>
+        <p:style>
+          <a:lnRef idx="2">
+            <a:schemeClr val="accent1">
+              <a:shade val="50000"/>
+            </a:schemeClr>
+          </a:lnRef>
+          <a:fillRef idx="1">
+            <a:schemeClr val="accent1"/>
+          </a:fillRef>
+          <a:effectRef idx="0">
+            <a:schemeClr val="accent1"/>
+          </a:effectRef>
+          <a:fontRef idx="minor">
+            <a:schemeClr val="lt1"/>
+          </a:fontRef>
+        </p:style>
+        <p:txBody>
+          <a:bodyPr rtlCol="0" anchor="ctr"/>
+          <a:lstStyle/>
+          <a:p>
+            <a:pPr algn="ctr"/>
+            <a:r>
+              <a:rPr lang="zh-CN" altLang="en-US" dirty="0" smtClean="0"/>
+              <a:t>程序员</a:t>
+            </a:r>
+            <a:r>
+              <a:rPr lang="en-US" altLang="zh-CN" dirty="0" smtClean="0"/>
+              <a:t>1</a:t>
+            </a:r>
+            <a:endParaRPr lang="zh-CN" altLang="en-US" dirty="0"/>
+          </a:p>
+        </p:txBody>
+      </p:sp>
+      <p:sp>
+        <p:nvSpPr>
+          <p:cNvPr id="8" name="笑脸 7"/>
+          <p:cNvSpPr/>
+          <p:nvPr/>
+        </p:nvSpPr>
+        <p:spPr>
+          <a:xfrm>
+            <a:off x="3491880" y="4797152"/>
+            <a:ext cx="1728192" cy="1440160"/>
+          </a:xfrm>
+          <a:prstGeom prst="smileyFace">
+            <a:avLst/>
+          </a:prstGeom>
+        </p:spPr>
+        <p:style>
+          <a:lnRef idx="2">
+            <a:schemeClr val="accent1">
+              <a:shade val="50000"/>
+            </a:schemeClr>
+          </a:lnRef>
+          <a:fillRef idx="1">
+            <a:schemeClr val="accent1"/>
+          </a:fillRef>
+          <a:effectRef idx="0">
+            <a:schemeClr val="accent1"/>
+          </a:effectRef>
+          <a:fontRef idx="minor">
+            <a:schemeClr val="lt1"/>
+          </a:fontRef>
+        </p:style>
+        <p:txBody>
+          <a:bodyPr rtlCol="0" anchor="ctr"/>
+          <a:lstStyle/>
+          <a:p>
+            <a:pPr algn="ctr"/>
+            <a:r>
+              <a:rPr lang="zh-CN" altLang="en-US" dirty="0" smtClean="0"/>
+              <a:t>程序员</a:t>
+            </a:r>
+            <a:r>
+              <a:rPr lang="en-US" altLang="zh-CN" dirty="0" smtClean="0"/>
+              <a:t>2</a:t>
+            </a:r>
+            <a:endParaRPr lang="zh-CN" altLang="en-US" dirty="0"/>
+          </a:p>
+        </p:txBody>
+      </p:sp>
+      <p:sp>
+        <p:nvSpPr>
+          <p:cNvPr id="9" name="笑脸 8"/>
+          <p:cNvSpPr/>
+          <p:nvPr/>
+        </p:nvSpPr>
+        <p:spPr>
+          <a:xfrm>
+            <a:off x="6228184" y="4509120"/>
+            <a:ext cx="1728192" cy="1440160"/>
+          </a:xfrm>
+          <a:prstGeom prst="smileyFace">
+            <a:avLst/>
+          </a:prstGeom>
+        </p:spPr>
+        <p:style>
+          <a:lnRef idx="2">
+            <a:schemeClr val="accent1">
+              <a:shade val="50000"/>
+            </a:schemeClr>
+          </a:lnRef>
+          <a:fillRef idx="1">
+            <a:schemeClr val="accent1"/>
+          </a:fillRef>
+          <a:effectRef idx="0">
+            <a:schemeClr val="accent1"/>
+          </a:effectRef>
+          <a:fontRef idx="minor">
+            <a:schemeClr val="lt1"/>
+          </a:fontRef>
+        </p:style>
+        <p:txBody>
+          <a:bodyPr rtlCol="0" anchor="ctr"/>
+          <a:lstStyle/>
+          <a:p>
+            <a:pPr algn="ctr"/>
+            <a:r>
+              <a:rPr lang="zh-CN" altLang="en-US" dirty="0" smtClean="0"/>
+              <a:t>程序</a:t>
+            </a:r>
+            <a:r>
+              <a:rPr lang="zh-CN" altLang="en-US" dirty="0" smtClean="0"/>
+              <a:t>员</a:t>
+            </a:r>
+            <a:r>
+              <a:rPr lang="en-US" altLang="zh-CN" dirty="0" smtClean="0"/>
+              <a:t>3</a:t>
+            </a:r>
+            <a:endParaRPr lang="zh-CN" altLang="en-US" dirty="0"/>
+          </a:p>
+        </p:txBody>
+      </p:sp>
+      <p:sp>
+        <p:nvSpPr>
+          <p:cNvPr id="15" name="左箭头 14"/>
+          <p:cNvSpPr/>
+          <p:nvPr/>
+        </p:nvSpPr>
+        <p:spPr>
+          <a:xfrm rot="7894011">
+            <a:off x="1893121" y="3457622"/>
+            <a:ext cx="1296144" cy="216024"/>
+          </a:xfrm>
+          <a:prstGeom prst="leftArrow">
+            <a:avLst/>
+          </a:prstGeom>
+        </p:spPr>
+        <p:style>
+          <a:lnRef idx="2">
+            <a:schemeClr val="accent1">
+              <a:shade val="50000"/>
+            </a:schemeClr>
+          </a:lnRef>
+          <a:fillRef idx="1">
+            <a:schemeClr val="accent1"/>
+          </a:fillRef>
+          <a:effectRef idx="0">
+            <a:schemeClr val="accent1"/>
+          </a:effectRef>
+          <a:fontRef idx="minor">
+            <a:schemeClr val="lt1"/>
+          </a:fontRef>
+        </p:style>
+        <p:txBody>
+          <a:bodyPr rtlCol="0" anchor="ctr"/>
+          <a:lstStyle/>
+          <a:p>
+            <a:pPr algn="ctr"/>
+            <a:endParaRPr lang="zh-CN" altLang="en-US"/>
+          </a:p>
+        </p:txBody>
+      </p:sp>
+      <p:sp>
+        <p:nvSpPr>
+          <p:cNvPr id="16" name="左箭头 15"/>
+          <p:cNvSpPr/>
+          <p:nvPr/>
+        </p:nvSpPr>
+        <p:spPr>
+          <a:xfrm rot="18539854">
+            <a:off x="2045521" y="3610022"/>
+            <a:ext cx="1296144" cy="216024"/>
+          </a:xfrm>
+          <a:prstGeom prst="leftArrow">
+            <a:avLst/>
+          </a:prstGeom>
+        </p:spPr>
+        <p:style>
+          <a:lnRef idx="2">
+            <a:schemeClr val="accent1">
+              <a:shade val="50000"/>
+            </a:schemeClr>
+          </a:lnRef>
+          <a:fillRef idx="1">
+            <a:schemeClr val="accent1"/>
+          </a:fillRef>
+          <a:effectRef idx="0">
+            <a:schemeClr val="accent1"/>
+          </a:effectRef>
+          <a:fontRef idx="minor">
+            <a:schemeClr val="lt1"/>
+          </a:fontRef>
+        </p:style>
+        <p:txBody>
+          <a:bodyPr rtlCol="0" anchor="ctr"/>
+          <a:lstStyle/>
+          <a:p>
+            <a:pPr algn="ctr"/>
+            <a:endParaRPr lang="zh-CN" altLang="en-US"/>
+          </a:p>
+        </p:txBody>
+      </p:sp>
+      <p:sp>
+        <p:nvSpPr>
+          <p:cNvPr id="18" name="TextBox 17"/>
+          <p:cNvSpPr txBox="1"/>
+          <p:nvPr/>
+        </p:nvSpPr>
+        <p:spPr>
+          <a:xfrm>
+            <a:off x="1331640" y="3212976"/>
+            <a:ext cx="922047" cy="369332"/>
+          </a:xfrm>
+          <a:prstGeom prst="rect">
+            <a:avLst/>
+          </a:prstGeom>
+          <a:noFill/>
+        </p:spPr>
+        <p:txBody>
+          <a:bodyPr wrap="none" rtlCol="0">
+            <a:spAutoFit/>
+          </a:bodyPr>
+          <a:lstStyle/>
+          <a:p>
+            <a:r>
+              <a:rPr lang="en-US" altLang="zh-CN" dirty="0" err="1" smtClean="0"/>
+              <a:t>git</a:t>
+            </a:r>
+            <a:r>
+              <a:rPr lang="en-US" altLang="zh-CN" dirty="0" smtClean="0"/>
+              <a:t> push</a:t>
+            </a:r>
+            <a:endParaRPr lang="zh-CN" altLang="en-US" dirty="0"/>
+          </a:p>
+        </p:txBody>
+      </p:sp>
+      <p:sp>
+        <p:nvSpPr>
+          <p:cNvPr id="19" name="TextBox 18"/>
+          <p:cNvSpPr txBox="1"/>
+          <p:nvPr/>
+        </p:nvSpPr>
+        <p:spPr>
+          <a:xfrm>
+            <a:off x="2843808" y="3789040"/>
+            <a:ext cx="845103" cy="369332"/>
+          </a:xfrm>
+          <a:prstGeom prst="rect">
+            <a:avLst/>
+          </a:prstGeom>
+          <a:noFill/>
+        </p:spPr>
+        <p:txBody>
+          <a:bodyPr wrap="none" rtlCol="0">
+            <a:spAutoFit/>
+          </a:bodyPr>
+          <a:lstStyle/>
+          <a:p>
+            <a:r>
+              <a:rPr lang="en-US" altLang="zh-CN" dirty="0" err="1" smtClean="0"/>
+              <a:t>git</a:t>
+            </a:r>
+            <a:r>
+              <a:rPr lang="en-US" altLang="zh-CN" dirty="0" smtClean="0"/>
+              <a:t> pull</a:t>
+            </a:r>
+            <a:endParaRPr lang="zh-CN" altLang="en-US" dirty="0"/>
+          </a:p>
+        </p:txBody>
+      </p:sp>
+      <p:sp>
+        <p:nvSpPr>
+          <p:cNvPr id="20" name="TextBox 19"/>
+          <p:cNvSpPr txBox="1"/>
+          <p:nvPr/>
+        </p:nvSpPr>
+        <p:spPr>
+          <a:xfrm>
+            <a:off x="1331640" y="6021288"/>
+            <a:ext cx="2172390" cy="646331"/>
+          </a:xfrm>
+          <a:prstGeom prst="rect">
+            <a:avLst/>
+          </a:prstGeom>
+          <a:noFill/>
+        </p:spPr>
+        <p:txBody>
+          <a:bodyPr wrap="none" rtlCol="0">
+            <a:spAutoFit/>
+          </a:bodyPr>
+          <a:lstStyle/>
+          <a:p>
+            <a:r>
+              <a:rPr lang="en-US" altLang="zh-CN" dirty="0" err="1" smtClean="0"/>
+              <a:t>git</a:t>
+            </a:r>
+            <a:r>
+              <a:rPr lang="en-US" altLang="zh-CN" dirty="0" smtClean="0"/>
+              <a:t> clone </a:t>
+            </a:r>
+            <a:r>
+              <a:rPr lang="zh-CN" altLang="en-US" dirty="0" smtClean="0"/>
+              <a:t>首次使用</a:t>
+            </a:r>
+            <a:endParaRPr lang="en-US" altLang="zh-CN" dirty="0" smtClean="0"/>
+          </a:p>
+          <a:p>
+            <a:r>
+              <a:rPr lang="en-US" altLang="zh-CN" dirty="0" err="1" smtClean="0"/>
+              <a:t>git</a:t>
+            </a:r>
+            <a:r>
+              <a:rPr lang="en-US" altLang="zh-CN" dirty="0" smtClean="0"/>
+              <a:t> commit </a:t>
+            </a:r>
+            <a:r>
+              <a:rPr lang="zh-CN" altLang="en-US" dirty="0" smtClean="0"/>
+              <a:t>提交代码</a:t>
+            </a:r>
+            <a:endParaRPr lang="zh-CN" altLang="en-US" dirty="0"/>
+          </a:p>
+        </p:txBody>
+      </p:sp>
+      <p:sp>
+        <p:nvSpPr>
+          <p:cNvPr id="21" name="左箭头 20"/>
+          <p:cNvSpPr/>
+          <p:nvPr/>
+        </p:nvSpPr>
+        <p:spPr>
+          <a:xfrm rot="5400000">
+            <a:off x="3471208" y="3668215"/>
+            <a:ext cx="1296144" cy="216024"/>
+          </a:xfrm>
+          <a:prstGeom prst="leftArrow">
+            <a:avLst/>
+          </a:prstGeom>
+        </p:spPr>
+        <p:style>
+          <a:lnRef idx="2">
+            <a:schemeClr val="accent1">
+              <a:shade val="50000"/>
+            </a:schemeClr>
+          </a:lnRef>
+          <a:fillRef idx="1">
+            <a:schemeClr val="accent1"/>
+          </a:fillRef>
+          <a:effectRef idx="0">
+            <a:schemeClr val="accent1"/>
+          </a:effectRef>
+          <a:fontRef idx="minor">
+            <a:schemeClr val="lt1"/>
+          </a:fontRef>
+        </p:style>
+        <p:txBody>
+          <a:bodyPr rtlCol="0" anchor="ctr"/>
+          <a:lstStyle/>
+          <a:p>
+            <a:pPr algn="ctr"/>
+            <a:endParaRPr lang="zh-CN" altLang="en-US"/>
+          </a:p>
+        </p:txBody>
+      </p:sp>
+      <p:sp>
+        <p:nvSpPr>
+          <p:cNvPr id="22" name="左箭头 21"/>
+          <p:cNvSpPr/>
+          <p:nvPr/>
+        </p:nvSpPr>
+        <p:spPr>
+          <a:xfrm rot="16200000">
+            <a:off x="3623608" y="3820615"/>
+            <a:ext cx="1296144" cy="216024"/>
+          </a:xfrm>
+          <a:prstGeom prst="leftArrow">
+            <a:avLst/>
+          </a:prstGeom>
+        </p:spPr>
+        <p:style>
+          <a:lnRef idx="2">
+            <a:schemeClr val="accent1">
+              <a:shade val="50000"/>
+            </a:schemeClr>
+          </a:lnRef>
+          <a:fillRef idx="1">
+            <a:schemeClr val="accent1"/>
+          </a:fillRef>
+          <a:effectRef idx="0">
+            <a:schemeClr val="accent1"/>
+          </a:effectRef>
+          <a:fontRef idx="minor">
+            <a:schemeClr val="lt1"/>
+          </a:fontRef>
+        </p:style>
+        <p:txBody>
+          <a:bodyPr rtlCol="0" anchor="ctr"/>
+          <a:lstStyle/>
+          <a:p>
+            <a:pPr algn="ctr"/>
+            <a:endParaRPr lang="zh-CN" altLang="en-US"/>
+          </a:p>
+        </p:txBody>
+      </p:sp>
+      <p:sp>
+        <p:nvSpPr>
+          <p:cNvPr id="23" name="左箭头 22"/>
+          <p:cNvSpPr/>
+          <p:nvPr/>
+        </p:nvSpPr>
+        <p:spPr>
+          <a:xfrm rot="2801833">
+            <a:off x="5887176" y="3578664"/>
+            <a:ext cx="1296144" cy="216024"/>
+          </a:xfrm>
+          <a:prstGeom prst="leftArrow">
+            <a:avLst/>
+          </a:prstGeom>
+        </p:spPr>
+        <p:style>
+          <a:lnRef idx="2">
+            <a:schemeClr val="accent1">
+              <a:shade val="50000"/>
+            </a:schemeClr>
+          </a:lnRef>
+          <a:fillRef idx="1">
+            <a:schemeClr val="accent1"/>
+          </a:fillRef>
+          <a:effectRef idx="0">
+            <a:schemeClr val="accent1"/>
+          </a:effectRef>
+          <a:fontRef idx="minor">
+            <a:schemeClr val="lt1"/>
+          </a:fontRef>
+        </p:style>
+        <p:txBody>
+          <a:bodyPr rtlCol="0" anchor="ctr"/>
+          <a:lstStyle/>
+          <a:p>
+            <a:pPr algn="ctr"/>
+            <a:endParaRPr lang="zh-CN" altLang="en-US"/>
+          </a:p>
+        </p:txBody>
+      </p:sp>
+      <p:sp>
+        <p:nvSpPr>
+          <p:cNvPr id="24" name="左箭头 23"/>
+          <p:cNvSpPr/>
+          <p:nvPr/>
+        </p:nvSpPr>
+        <p:spPr>
+          <a:xfrm rot="13738438">
+            <a:off x="5760454" y="3849746"/>
+            <a:ext cx="1296144" cy="216024"/>
+          </a:xfrm>
+          <a:prstGeom prst="leftArrow">
+            <a:avLst/>
+          </a:prstGeom>
+        </p:spPr>
+        <p:style>
+          <a:lnRef idx="2">
+            <a:schemeClr val="accent1">
+              <a:shade val="50000"/>
+            </a:schemeClr>
+          </a:lnRef>
+          <a:fillRef idx="1">
+            <a:schemeClr val="accent1"/>
+          </a:fillRef>
+          <a:effectRef idx="0">
+            <a:schemeClr val="accent1"/>
+          </a:effectRef>
+          <a:fontRef idx="minor">
+            <a:schemeClr val="lt1"/>
+          </a:fontRef>
+        </p:style>
+        <p:txBody>
+          <a:bodyPr rtlCol="0" anchor="ctr"/>
+          <a:lstStyle/>
+          <a:p>
+            <a:pPr algn="ctr"/>
+            <a:endParaRPr lang="zh-CN" altLang="en-US"/>
+          </a:p>
+        </p:txBody>
+      </p:sp>
+    </p:spTree>
+  </p:cSld>
+  <p:clrMapOvr>
+    <a:masterClrMapping/>
+  </p:clrMapOvr>
+  <p:timing>
+    <p:tnLst>
+      <p:par>
+        <p:cTn id="1" dur="indefinite" restart="never" nodeType="tmRoot"/>
+      </p:par>
+    </p:tnLst>
+  </p:timing>
+</p:sld>
+</file>
+
+<file path=ppt/slides/slide5.xml><?xml version="1.0" encoding="utf-8"?>
+<p:sld xmlns:a="http://schemas.openxmlformats.org/drawingml/2006/main" xmlns:r="http://schemas.openxmlformats.org/officeDocument/2006/relationships" xmlns:p="http://schemas.openxmlformats.org/presentationml/2006/main">
+  <p:cSld>
+    <p:spTree>
+      <p:nvGrpSpPr>
+        <p:cNvPr id="1" name=""/>
+        <p:cNvGrpSpPr/>
+        <p:nvPr/>
+      </p:nvGrpSpPr>
+      <p:grpSpPr>
+        <a:xfrm>
+          <a:off x="0" y="0"/>
+          <a:ext cx="0" cy="0"/>
+          <a:chOff x="0" y="0"/>
+          <a:chExt cx="0" cy="0"/>
+        </a:xfrm>
+      </p:grpSpPr>
+      <p:sp>
+        <p:nvSpPr>
+          <p:cNvPr id="2" name="标题 1"/>
+          <p:cNvSpPr>
+            <a:spLocks noGrp="1"/>
+          </p:cNvSpPr>
+          <p:nvPr>
+            <p:ph type="title"/>
+          </p:nvPr>
+        </p:nvSpPr>
+        <p:spPr/>
+        <p:txBody>
+          <a:bodyPr/>
+          <a:lstStyle/>
+          <a:p>
+            <a:r>
+              <a:rPr lang="zh-CN" altLang="en-US" dirty="0" smtClean="0"/>
+              <a:t>日常使用</a:t>
+            </a:r>
+            <a:endParaRPr lang="zh-CN" altLang="en-US" dirty="0"/>
+          </a:p>
+        </p:txBody>
+      </p:sp>
+      <p:sp>
+        <p:nvSpPr>
+          <p:cNvPr id="3" name="内容占位符 2"/>
+          <p:cNvSpPr>
+            <a:spLocks noGrp="1"/>
+          </p:cNvSpPr>
+          <p:nvPr>
+            <p:ph idx="1"/>
+          </p:nvPr>
+        </p:nvSpPr>
+        <p:spPr/>
+        <p:txBody>
+          <a:bodyPr>
+            <a:normAutofit/>
+          </a:bodyPr>
+          <a:lstStyle/>
+          <a:p>
+            <a:r>
+              <a:rPr lang="en-US" altLang="zh-CN" dirty="0" err="1" smtClean="0"/>
+              <a:t>git</a:t>
+            </a:r>
+            <a:r>
+              <a:rPr lang="en-US" altLang="zh-CN" dirty="0" smtClean="0"/>
+              <a:t> pull origin master (</a:t>
+            </a:r>
+            <a:r>
+              <a:rPr lang="zh-CN" altLang="en-US" dirty="0" smtClean="0"/>
+              <a:t>更</a:t>
+            </a:r>
+            <a:r>
+              <a:rPr lang="zh-CN" altLang="en-US" dirty="0" smtClean="0"/>
+              <a:t>新本地代码到最新）</a:t>
+            </a:r>
+            <a:endParaRPr lang="en-US" altLang="zh-CN" dirty="0" smtClean="0"/>
+          </a:p>
+          <a:p>
+            <a:r>
+              <a:rPr lang="zh-CN" altLang="en-US" dirty="0" smtClean="0"/>
+              <a:t>进</a:t>
+            </a:r>
+            <a:r>
+              <a:rPr lang="zh-CN" altLang="en-US" dirty="0" smtClean="0"/>
+              <a:t>行编辑更改（增删改）</a:t>
+            </a:r>
+            <a:endParaRPr lang="en-US" altLang="zh-CN" dirty="0" smtClean="0"/>
+          </a:p>
+          <a:p>
+            <a:r>
+              <a:rPr lang="en-US" altLang="zh-CN" dirty="0" err="1" smtClean="0"/>
+              <a:t>git</a:t>
+            </a:r>
+            <a:r>
+              <a:rPr lang="en-US" altLang="zh-CN" dirty="0" smtClean="0"/>
+              <a:t> add –A (</a:t>
+            </a:r>
+            <a:r>
+              <a:rPr lang="zh-CN" altLang="en-US" dirty="0" smtClean="0"/>
+              <a:t>将</a:t>
+            </a:r>
+            <a:r>
+              <a:rPr lang="zh-CN" altLang="en-US" dirty="0" smtClean="0"/>
+              <a:t>更改加入到版本库）</a:t>
+            </a:r>
+            <a:endParaRPr lang="en-US" altLang="zh-CN" dirty="0" smtClean="0"/>
+          </a:p>
+          <a:p>
+            <a:r>
+              <a:rPr lang="en-US" altLang="zh-CN" dirty="0" err="1" smtClean="0"/>
+              <a:t>git</a:t>
+            </a:r>
+            <a:r>
+              <a:rPr lang="en-US" altLang="zh-CN" dirty="0" smtClean="0"/>
+              <a:t> commit –m “</a:t>
+            </a:r>
+            <a:r>
+              <a:rPr lang="zh-CN" altLang="en-US" dirty="0" smtClean="0"/>
+              <a:t>更</a:t>
+            </a:r>
+            <a:r>
+              <a:rPr lang="zh-CN" altLang="en-US" dirty="0" smtClean="0"/>
+              <a:t>改注释</a:t>
+            </a:r>
+            <a:r>
+              <a:rPr lang="en-US" altLang="zh-CN" dirty="0" smtClean="0"/>
+              <a:t>” </a:t>
+            </a:r>
+          </a:p>
+          <a:p>
+            <a:r>
+              <a:rPr lang="en-US" altLang="zh-CN" dirty="0" err="1" smtClean="0"/>
+              <a:t>git</a:t>
+            </a:r>
+            <a:r>
+              <a:rPr lang="en-US" altLang="zh-CN" dirty="0" smtClean="0"/>
+              <a:t> pull origin master (</a:t>
+            </a:r>
+            <a:r>
+              <a:rPr lang="zh-CN" altLang="en-US" dirty="0" smtClean="0"/>
+              <a:t>更新本地代码到最新</a:t>
+            </a:r>
+            <a:r>
+              <a:rPr lang="zh-CN" altLang="en-US" dirty="0" smtClean="0"/>
+              <a:t>）</a:t>
+            </a:r>
+            <a:endParaRPr lang="en-US" altLang="zh-CN" dirty="0" smtClean="0"/>
+          </a:p>
+          <a:p>
+            <a:r>
+              <a:rPr lang="en-US" altLang="zh-CN" dirty="0" err="1" smtClean="0"/>
+              <a:t>git</a:t>
+            </a:r>
+            <a:r>
+              <a:rPr lang="en-US" altLang="zh-CN" dirty="0" smtClean="0"/>
+              <a:t> push origin master (</a:t>
+            </a:r>
+            <a:r>
+              <a:rPr lang="zh-CN" altLang="en-US" dirty="0" smtClean="0"/>
+              <a:t>讲本地更改提交到服务器）</a:t>
+            </a:r>
+            <a:endParaRPr lang="zh-CN" altLang="en-US" dirty="0"/>
+          </a:p>
+        </p:txBody>
+      </p:sp>
+      <p:sp>
+        <p:nvSpPr>
+          <p:cNvPr id="4" name="日期占位符 3"/>
+          <p:cNvSpPr>
+            <a:spLocks noGrp="1"/>
+          </p:cNvSpPr>
+          <p:nvPr>
+            <p:ph type="dt" sz="half" idx="10"/>
+          </p:nvPr>
+        </p:nvSpPr>
+        <p:spPr/>
+        <p:txBody>
+          <a:bodyPr/>
+          <a:lstStyle/>
+          <a:p>
+            <a:r>
+              <a:rPr lang="en-US" altLang="zh-CN" smtClean="0"/>
+              <a:t>2015/4/7</a:t>
+            </a:r>
+            <a:endParaRPr lang="zh-CN" altLang="en-US"/>
+          </a:p>
+        </p:txBody>
+      </p:sp>
+      <p:sp>
+        <p:nvSpPr>
+          <p:cNvPr id="5" name="页脚占位符 4"/>
+          <p:cNvSpPr>
+            <a:spLocks noGrp="1"/>
+          </p:cNvSpPr>
+          <p:nvPr>
+            <p:ph type="ftr" sz="quarter" idx="11"/>
+          </p:nvPr>
+        </p:nvSpPr>
+        <p:spPr/>
+        <p:txBody>
+          <a:bodyPr/>
+          <a:lstStyle/>
+          <a:p>
+            <a:r>
+              <a:rPr lang="zh-CN" altLang="en-US" smtClean="0"/>
+              <a:t>朱涛</a:t>
+            </a:r>
+            <a:endParaRPr lang="zh-CN" altLang="en-US"/>
+          </a:p>
+        </p:txBody>
+      </p:sp>
+    </p:spTree>
+  </p:cSld>
+  <p:clrMapOvr>
+    <a:masterClrMapping/>
+  </p:clrMapOvr>
+  <p:timing>
+    <p:tnLst>
+      <p:par>
+        <p:cTn id="1" dur="indefinite" restart="never" nodeType="tmRoot"/>
+      </p:par>
+    </p:tnLst>
+  </p:timing>
 </p:sld>
 </file>
 

</xml_diff>

<commit_message>
update ppt and codes
</commit_message>
<xml_diff>
--- a/lesson1/git.pptx
+++ b/lesson1/git.pptx
@@ -5,7 +5,7 @@
     <p:sldMasterId id="2147483648" r:id="rId1"/>
   </p:sldMasterIdLst>
   <p:notesMasterIdLst>
-    <p:notesMasterId r:id="rId7"/>
+    <p:notesMasterId r:id="rId8"/>
   </p:notesMasterIdLst>
   <p:sldIdLst>
     <p:sldId id="256" r:id="rId2"/>
@@ -13,6 +13,7 @@
     <p:sldId id="258" r:id="rId4"/>
     <p:sldId id="259" r:id="rId5"/>
     <p:sldId id="260" r:id="rId6"/>
+    <p:sldId id="261" r:id="rId7"/>
   </p:sldIdLst>
   <p:sldSz cx="9144000" cy="6858000" type="screen4x3"/>
   <p:notesSz cx="6858000" cy="9144000"/>
@@ -4203,11 +4204,7 @@
             <a:pPr algn="ctr"/>
             <a:r>
               <a:rPr lang="zh-CN" altLang="en-US" dirty="0" smtClean="0"/>
-              <a:t>程序</a:t>
-            </a:r>
-            <a:r>
-              <a:rPr lang="zh-CN" altLang="en-US" dirty="0" smtClean="0"/>
-              <a:t>员</a:t>
+              <a:t>程序员</a:t>
             </a:r>
             <a:r>
               <a:rPr lang="en-US" altLang="zh-CN" dirty="0" smtClean="0"/>
@@ -4660,22 +4657,14 @@
             </a:r>
             <a:r>
               <a:rPr lang="zh-CN" altLang="en-US" dirty="0" smtClean="0"/>
-              <a:t>更</a:t>
-            </a:r>
-            <a:r>
-              <a:rPr lang="zh-CN" altLang="en-US" dirty="0" smtClean="0"/>
-              <a:t>新本地代码到最新）</a:t>
+              <a:t>更新本地代码到最新）</a:t>
             </a:r>
             <a:endParaRPr lang="en-US" altLang="zh-CN" dirty="0" smtClean="0"/>
           </a:p>
           <a:p>
             <a:r>
               <a:rPr lang="zh-CN" altLang="en-US" dirty="0" smtClean="0"/>
-              <a:t>进</a:t>
-            </a:r>
-            <a:r>
-              <a:rPr lang="zh-CN" altLang="en-US" dirty="0" smtClean="0"/>
-              <a:t>行编辑更改（增删改）</a:t>
+              <a:t>进行编辑更改（增删改）</a:t>
             </a:r>
             <a:endParaRPr lang="en-US" altLang="zh-CN" dirty="0" smtClean="0"/>
           </a:p>
@@ -4690,11 +4679,7 @@
             </a:r>
             <a:r>
               <a:rPr lang="zh-CN" altLang="en-US" dirty="0" smtClean="0"/>
-              <a:t>将</a:t>
-            </a:r>
-            <a:r>
-              <a:rPr lang="zh-CN" altLang="en-US" dirty="0" smtClean="0"/>
-              <a:t>更改加入到版本库）</a:t>
+              <a:t>将更改加入到版本库）</a:t>
             </a:r>
             <a:endParaRPr lang="en-US" altLang="zh-CN" dirty="0" smtClean="0"/>
           </a:p>
@@ -4709,11 +4694,7 @@
             </a:r>
             <a:r>
               <a:rPr lang="zh-CN" altLang="en-US" dirty="0" smtClean="0"/>
-              <a:t>更</a:t>
-            </a:r>
-            <a:r>
-              <a:rPr lang="zh-CN" altLang="en-US" dirty="0" smtClean="0"/>
-              <a:t>改注释</a:t>
+              <a:t>更改注释</a:t>
             </a:r>
             <a:r>
               <a:rPr lang="en-US" altLang="zh-CN" dirty="0" smtClean="0"/>
@@ -4731,11 +4712,7 @@
             </a:r>
             <a:r>
               <a:rPr lang="zh-CN" altLang="en-US" dirty="0" smtClean="0"/>
-              <a:t>更新本地代码到最新</a:t>
-            </a:r>
-            <a:r>
-              <a:rPr lang="zh-CN" altLang="en-US" dirty="0" smtClean="0"/>
-              <a:t>）</a:t>
+              <a:t>更新本地代码到最新）</a:t>
             </a:r>
             <a:endParaRPr lang="en-US" altLang="zh-CN" dirty="0" smtClean="0"/>
           </a:p>
@@ -4814,6 +4791,519 @@
       </p:par>
     </p:tnLst>
   </p:timing>
+</p:sld>
+</file>
+
+<file path=ppt/slides/slide6.xml><?xml version="1.0" encoding="utf-8"?>
+<p:sld xmlns:a="http://schemas.openxmlformats.org/drawingml/2006/main" xmlns:r="http://schemas.openxmlformats.org/officeDocument/2006/relationships" xmlns:p="http://schemas.openxmlformats.org/presentationml/2006/main">
+  <p:cSld>
+    <p:spTree>
+      <p:nvGrpSpPr>
+        <p:cNvPr id="1" name=""/>
+        <p:cNvGrpSpPr/>
+        <p:nvPr/>
+      </p:nvGrpSpPr>
+      <p:grpSpPr>
+        <a:xfrm>
+          <a:off x="0" y="0"/>
+          <a:ext cx="0" cy="0"/>
+          <a:chOff x="0" y="0"/>
+          <a:chExt cx="0" cy="0"/>
+        </a:xfrm>
+      </p:grpSpPr>
+      <p:sp>
+        <p:nvSpPr>
+          <p:cNvPr id="2" name="标题 1"/>
+          <p:cNvSpPr>
+            <a:spLocks noGrp="1"/>
+          </p:cNvSpPr>
+          <p:nvPr>
+            <p:ph type="title"/>
+          </p:nvPr>
+        </p:nvSpPr>
+        <p:spPr/>
+        <p:txBody>
+          <a:bodyPr/>
+          <a:lstStyle/>
+          <a:p>
+            <a:r>
+              <a:rPr lang="zh-CN" altLang="en-US" dirty="0" smtClean="0"/>
+              <a:t>一</a:t>
+            </a:r>
+            <a:r>
+              <a:rPr lang="zh-CN" altLang="en-US" dirty="0" smtClean="0"/>
+              <a:t>个招聘</a:t>
+            </a:r>
+            <a:endParaRPr lang="zh-CN" altLang="en-US" dirty="0"/>
+          </a:p>
+        </p:txBody>
+      </p:sp>
+      <p:sp>
+        <p:nvSpPr>
+          <p:cNvPr id="3" name="内容占位符 2"/>
+          <p:cNvSpPr>
+            <a:spLocks noGrp="1"/>
+          </p:cNvSpPr>
+          <p:nvPr>
+            <p:ph idx="1"/>
+          </p:nvPr>
+        </p:nvSpPr>
+        <p:spPr>
+          <a:xfrm>
+            <a:off x="457200" y="1196752"/>
+            <a:ext cx="8229600" cy="5112568"/>
+          </a:xfrm>
+        </p:spPr>
+        <p:txBody>
+          <a:bodyPr>
+            <a:normAutofit fontScale="40000" lnSpcReduction="20000"/>
+          </a:bodyPr>
+          <a:lstStyle/>
+          <a:p>
+            <a:r>
+              <a:rPr lang="en-US" altLang="zh-CN" dirty="0" smtClean="0"/>
+              <a:t>- </a:t>
+            </a:r>
+            <a:r>
+              <a:rPr lang="zh-CN" altLang="en-US" dirty="0" smtClean="0"/>
+              <a:t>薪资 </a:t>
+            </a:r>
+            <a:r>
+              <a:rPr lang="en-US" altLang="zh-CN" dirty="0" smtClean="0"/>
+              <a:t>20W-35W</a:t>
+            </a:r>
+            <a:r>
+              <a:rPr lang="zh-CN" altLang="en-US" dirty="0" smtClean="0"/>
+              <a:t>，按能力定薪水，高手不受限制</a:t>
+            </a:r>
+            <a:r>
+              <a:rPr lang="en-US" altLang="zh-CN" dirty="0" smtClean="0"/>
+              <a:t>-</a:t>
+            </a:r>
+            <a:r>
+              <a:rPr lang="zh-CN" altLang="en-US" dirty="0" smtClean="0"/>
+              <a:t>绝不是一句戏言  </a:t>
+            </a:r>
+            <a:br>
+              <a:rPr lang="zh-CN" altLang="en-US" dirty="0" smtClean="0"/>
+            </a:br>
+            <a:r>
+              <a:rPr lang="en-US" altLang="zh-CN" dirty="0" smtClean="0"/>
+              <a:t>- </a:t>
+            </a:r>
+            <a:r>
+              <a:rPr lang="zh-CN" altLang="en-US" dirty="0" smtClean="0"/>
+              <a:t>非北京同学支持远程电话一面省去你远途烦恼。  </a:t>
+            </a:r>
+            <a:br>
+              <a:rPr lang="zh-CN" altLang="en-US" dirty="0" smtClean="0"/>
+            </a:br>
+            <a:r>
+              <a:rPr lang="en-US" altLang="zh-CN" dirty="0" smtClean="0"/>
+              <a:t>- </a:t>
+            </a:r>
+            <a:r>
+              <a:rPr lang="zh-CN" altLang="en-US" dirty="0" smtClean="0"/>
+              <a:t>下列要求仅是参考，如果你对自己有信心，对新闻类应用，高并发系统有热爱，请忽略要求，我们有太多太多的问题，也有太多太多机会，欢迎 聪明能干</a:t>
+            </a:r>
+            <a:r>
+              <a:rPr lang="en-US" altLang="zh-CN" dirty="0" smtClean="0"/>
+              <a:t>/</a:t>
+            </a:r>
+            <a:r>
+              <a:rPr lang="zh-CN" altLang="en-US" dirty="0" smtClean="0"/>
+              <a:t>富有经验 的你。  </a:t>
+            </a:r>
+            <a:br>
+              <a:rPr lang="zh-CN" altLang="en-US" dirty="0" smtClean="0"/>
+            </a:br>
+            <a:r>
+              <a:rPr lang="zh-CN" altLang="en-US" dirty="0" smtClean="0"/>
+              <a:t>    </a:t>
+            </a:r>
+            <a:br>
+              <a:rPr lang="zh-CN" altLang="en-US" dirty="0" smtClean="0"/>
+            </a:br>
+            <a:r>
+              <a:rPr lang="zh-CN" altLang="en-US" dirty="0" smtClean="0"/>
+              <a:t>基本要求：   </a:t>
+            </a:r>
+            <a:br>
+              <a:rPr lang="zh-CN" altLang="en-US" dirty="0" smtClean="0"/>
+            </a:br>
+            <a:r>
+              <a:rPr lang="en-US" altLang="zh-CN" dirty="0" smtClean="0"/>
+              <a:t>- </a:t>
+            </a:r>
+            <a:r>
+              <a:rPr lang="zh-CN" altLang="en-US" dirty="0" smtClean="0"/>
+              <a:t>要精通</a:t>
+            </a:r>
+            <a:r>
+              <a:rPr lang="en-US" altLang="zh-CN" dirty="0" smtClean="0"/>
+              <a:t>Java</a:t>
+            </a:r>
+            <a:r>
+              <a:rPr lang="zh-CN" altLang="en-US" dirty="0" smtClean="0"/>
+              <a:t>技术，阅读过</a:t>
+            </a:r>
+            <a:r>
+              <a:rPr lang="en-US" altLang="zh-CN" dirty="0" smtClean="0"/>
+              <a:t>JDK</a:t>
+            </a:r>
+            <a:r>
+              <a:rPr lang="zh-CN" altLang="en-US" dirty="0" smtClean="0"/>
+              <a:t>部分代码或其它框架源码，熟悉</a:t>
+            </a:r>
+            <a:r>
+              <a:rPr lang="en-US" altLang="zh-CN" dirty="0" smtClean="0"/>
+              <a:t>HTTP</a:t>
+            </a:r>
+            <a:r>
+              <a:rPr lang="zh-CN" altLang="en-US" dirty="0" smtClean="0"/>
+              <a:t>等常见网络协议；  </a:t>
+            </a:r>
+            <a:br>
+              <a:rPr lang="zh-CN" altLang="en-US" dirty="0" smtClean="0"/>
+            </a:br>
+            <a:r>
+              <a:rPr lang="en-US" altLang="zh-CN" dirty="0" smtClean="0"/>
+              <a:t>- </a:t>
+            </a:r>
+            <a:r>
+              <a:rPr lang="zh-CN" altLang="en-US" dirty="0" smtClean="0"/>
+              <a:t>熟悉常见的</a:t>
+            </a:r>
+            <a:r>
+              <a:rPr lang="en-US" altLang="zh-CN" dirty="0" smtClean="0"/>
+              <a:t>Java</a:t>
+            </a:r>
+            <a:r>
+              <a:rPr lang="zh-CN" altLang="en-US" dirty="0" smtClean="0"/>
+              <a:t>开发框架，完整参与开发或主导过一个互联网项目</a:t>
+            </a:r>
+            <a:r>
+              <a:rPr lang="en-US" altLang="zh-CN" dirty="0" smtClean="0"/>
+              <a:t>/</a:t>
+            </a:r>
+            <a:r>
+              <a:rPr lang="zh-CN" altLang="en-US" dirty="0" smtClean="0"/>
+              <a:t>模块，熟练使用</a:t>
+            </a:r>
+            <a:r>
+              <a:rPr lang="en-US" altLang="zh-CN" dirty="0" err="1" smtClean="0"/>
+              <a:t>Git</a:t>
+            </a:r>
+            <a:r>
+              <a:rPr lang="en-US" altLang="zh-CN" dirty="0" smtClean="0"/>
+              <a:t>   </a:t>
+            </a:r>
+            <a:br>
+              <a:rPr lang="en-US" altLang="zh-CN" dirty="0" smtClean="0"/>
+            </a:br>
+            <a:r>
+              <a:rPr lang="en-US" altLang="zh-CN" dirty="0" smtClean="0"/>
+              <a:t>- </a:t>
+            </a:r>
+            <a:r>
+              <a:rPr lang="zh-CN" altLang="en-US" dirty="0" smtClean="0"/>
+              <a:t>独立快速的处理各类系统问题，熟悉互联网开发模式  </a:t>
+            </a:r>
+            <a:br>
+              <a:rPr lang="zh-CN" altLang="en-US" dirty="0" smtClean="0"/>
+            </a:br>
+            <a:r>
+              <a:rPr lang="en-US" altLang="zh-CN" dirty="0" smtClean="0"/>
+              <a:t>- </a:t>
+            </a:r>
+            <a:r>
+              <a:rPr lang="zh-CN" altLang="en-US" dirty="0" smtClean="0"/>
+              <a:t>能独立使用</a:t>
+            </a:r>
+            <a:r>
+              <a:rPr lang="en-US" altLang="zh-CN" dirty="0" smtClean="0"/>
+              <a:t>Google</a:t>
+            </a:r>
+            <a:r>
+              <a:rPr lang="zh-CN" altLang="en-US" dirty="0" smtClean="0"/>
+              <a:t>，</a:t>
+            </a:r>
+            <a:r>
+              <a:rPr lang="en-US" altLang="zh-CN" dirty="0" err="1" smtClean="0"/>
+              <a:t>StackOverflow</a:t>
+            </a:r>
+            <a:r>
+              <a:rPr lang="zh-CN" altLang="en-US" dirty="0" smtClean="0"/>
+              <a:t>，越过长城走向世界  </a:t>
+            </a:r>
+            <a:br>
+              <a:rPr lang="zh-CN" altLang="en-US" dirty="0" smtClean="0"/>
+            </a:br>
+            <a:r>
+              <a:rPr lang="zh-CN" altLang="en-US" dirty="0" smtClean="0"/>
+              <a:t>    </a:t>
+            </a:r>
+            <a:br>
+              <a:rPr lang="zh-CN" altLang="en-US" dirty="0" smtClean="0"/>
+            </a:br>
+            <a:r>
+              <a:rPr lang="zh-CN" altLang="en-US" dirty="0" smtClean="0"/>
+              <a:t>加分项：   </a:t>
+            </a:r>
+            <a:br>
+              <a:rPr lang="zh-CN" altLang="en-US" dirty="0" smtClean="0"/>
+            </a:br>
+            <a:r>
+              <a:rPr lang="en-US" altLang="zh-CN" dirty="0" smtClean="0"/>
+              <a:t>- </a:t>
+            </a:r>
+            <a:r>
+              <a:rPr lang="zh-CN" altLang="en-US" dirty="0" smtClean="0"/>
+              <a:t>有个人维护的</a:t>
+            </a:r>
+            <a:r>
+              <a:rPr lang="en-US" altLang="zh-CN" dirty="0" err="1" smtClean="0"/>
+              <a:t>Github</a:t>
+            </a:r>
+            <a:r>
+              <a:rPr lang="zh-CN" altLang="en-US" dirty="0" smtClean="0"/>
+              <a:t>项目或组建   </a:t>
+            </a:r>
+            <a:br>
+              <a:rPr lang="zh-CN" altLang="en-US" dirty="0" smtClean="0"/>
+            </a:br>
+            <a:r>
+              <a:rPr lang="en-US" altLang="zh-CN" dirty="0" smtClean="0"/>
+              <a:t>- </a:t>
+            </a:r>
+            <a:r>
+              <a:rPr lang="zh-CN" altLang="en-US" dirty="0" smtClean="0"/>
+              <a:t>有大型移动互联网应用后台开发及架构设计经验   </a:t>
+            </a:r>
+            <a:br>
+              <a:rPr lang="zh-CN" altLang="en-US" dirty="0" smtClean="0"/>
+            </a:br>
+            <a:r>
+              <a:rPr lang="zh-CN" altLang="en-US" dirty="0" smtClean="0"/>
+              <a:t>    </a:t>
+            </a:r>
+            <a:br>
+              <a:rPr lang="zh-CN" altLang="en-US" dirty="0" smtClean="0"/>
+            </a:br>
+            <a:r>
+              <a:rPr lang="zh-CN" altLang="en-US" dirty="0" smtClean="0"/>
+              <a:t>你将承担和接触到的：   </a:t>
+            </a:r>
+            <a:br>
+              <a:rPr lang="zh-CN" altLang="en-US" dirty="0" smtClean="0"/>
+            </a:br>
+            <a:r>
+              <a:rPr lang="en-US" altLang="zh-CN" dirty="0" smtClean="0"/>
+              <a:t>- </a:t>
+            </a:r>
+            <a:r>
+              <a:rPr lang="zh-CN" altLang="en-US" dirty="0" smtClean="0"/>
+              <a:t>搜狐集团核心移动化产品的数据接口系统、用户系统、</a:t>
+            </a:r>
+            <a:r>
+              <a:rPr lang="en-US" altLang="zh-CN" dirty="0" smtClean="0"/>
+              <a:t>Push</a:t>
+            </a:r>
+            <a:r>
+              <a:rPr lang="zh-CN" altLang="en-US" dirty="0" smtClean="0"/>
+              <a:t>系统的开发工作   </a:t>
+            </a:r>
+            <a:br>
+              <a:rPr lang="zh-CN" altLang="en-US" dirty="0" smtClean="0"/>
+            </a:br>
+            <a:r>
+              <a:rPr lang="en-US" altLang="zh-CN" dirty="0" smtClean="0"/>
+              <a:t>- </a:t>
+            </a:r>
+            <a:r>
+              <a:rPr lang="zh-CN" altLang="en-US" dirty="0" smtClean="0"/>
+              <a:t>在产品快速迭代、系统数亿次高并发调用下服务的稳定，快速响应   </a:t>
+            </a:r>
+            <a:br>
+              <a:rPr lang="zh-CN" altLang="en-US" dirty="0" smtClean="0"/>
+            </a:br>
+            <a:r>
+              <a:rPr lang="en-US" altLang="zh-CN" dirty="0" smtClean="0"/>
+              <a:t>- </a:t>
+            </a:r>
+            <a:r>
+              <a:rPr lang="zh-CN" altLang="en-US" dirty="0" smtClean="0"/>
+              <a:t>责任服务代码的不断重构优化，线上问题的定位查找（非运维）  </a:t>
+            </a:r>
+            <a:br>
+              <a:rPr lang="zh-CN" altLang="en-US" dirty="0" smtClean="0"/>
+            </a:br>
+            <a:r>
+              <a:rPr lang="en-US" altLang="zh-CN" dirty="0" smtClean="0"/>
+              <a:t>- </a:t>
+            </a:r>
+            <a:r>
+              <a:rPr lang="zh-CN" altLang="en-US" dirty="0" smtClean="0"/>
+              <a:t>指导初级工程师按照需求完成代码开发，参与团队建设  </a:t>
+            </a:r>
+            <a:br>
+              <a:rPr lang="zh-CN" altLang="en-US" dirty="0" smtClean="0"/>
+            </a:br>
+            <a:r>
+              <a:rPr lang="zh-CN" altLang="en-US" dirty="0" smtClean="0"/>
+              <a:t>    </a:t>
+            </a:r>
+            <a:br>
+              <a:rPr lang="zh-CN" altLang="en-US" dirty="0" smtClean="0"/>
+            </a:br>
+            <a:r>
+              <a:rPr lang="zh-CN" altLang="en-US" dirty="0" smtClean="0"/>
+              <a:t>基本福利：   </a:t>
+            </a:r>
+            <a:br>
+              <a:rPr lang="zh-CN" altLang="en-US" dirty="0" smtClean="0"/>
+            </a:br>
+            <a:r>
+              <a:rPr lang="en-US" altLang="zh-CN" dirty="0" smtClean="0"/>
+              <a:t>- 15</a:t>
+            </a:r>
+            <a:r>
+              <a:rPr lang="zh-CN" altLang="en-US" dirty="0" smtClean="0"/>
+              <a:t>天带薪年假 节日礼品 周四水果日 带薪培训 扁平管理   </a:t>
+            </a:r>
+            <a:br>
+              <a:rPr lang="zh-CN" altLang="en-US" dirty="0" smtClean="0"/>
+            </a:br>
+            <a:r>
+              <a:rPr lang="zh-CN" altLang="en-US" dirty="0" smtClean="0"/>
+              <a:t>    </a:t>
+            </a:r>
+            <a:br>
+              <a:rPr lang="zh-CN" altLang="en-US" dirty="0" smtClean="0"/>
+            </a:br>
+            <a:r>
+              <a:rPr lang="zh-CN" altLang="en-US" dirty="0" smtClean="0"/>
+              <a:t>关于我们：   </a:t>
+            </a:r>
+            <a:br>
+              <a:rPr lang="zh-CN" altLang="en-US" dirty="0" smtClean="0"/>
+            </a:br>
+            <a:r>
+              <a:rPr lang="en-US" altLang="zh-CN" dirty="0" smtClean="0">
+                <a:hlinkClick r:id="rId2"/>
+              </a:rPr>
+              <a:t>http://k.sohu.com</a:t>
+            </a:r>
+            <a:r>
+              <a:rPr lang="en-US" altLang="zh-CN" dirty="0" smtClean="0"/>
+              <a:t>   </a:t>
+            </a:r>
+            <a:br>
+              <a:rPr lang="en-US" altLang="zh-CN" dirty="0" smtClean="0"/>
+            </a:br>
+            <a:r>
+              <a:rPr lang="en-US" altLang="zh-CN" dirty="0" smtClean="0"/>
+              <a:t>    </a:t>
+            </a:r>
+            <a:br>
+              <a:rPr lang="en-US" altLang="zh-CN" dirty="0" smtClean="0"/>
+            </a:br>
+            <a:r>
+              <a:rPr lang="zh-CN" altLang="en-US" dirty="0" smtClean="0"/>
+              <a:t>搜狐新闻客户端服务组，欢迎各位加盟</a:t>
+            </a:r>
+            <a:r>
+              <a:rPr lang="en-US" altLang="zh-CN" dirty="0" smtClean="0"/>
+              <a:t>~  </a:t>
+            </a:r>
+            <a:r>
+              <a:rPr lang="zh-CN" altLang="en-US" dirty="0" smtClean="0"/>
+              <a:t/>
+            </a:r>
+            <a:br>
+              <a:rPr lang="zh-CN" altLang="en-US" dirty="0" smtClean="0"/>
+            </a:br>
+            <a:r>
+              <a:rPr lang="zh-CN" altLang="en-US" dirty="0" smtClean="0"/>
+              <a:t>    </a:t>
+            </a:r>
+            <a:br>
+              <a:rPr lang="zh-CN" altLang="en-US" dirty="0" smtClean="0"/>
+            </a:br>
+            <a:r>
+              <a:rPr lang="en-US" altLang="zh-CN" dirty="0" err="1" smtClean="0"/>
+              <a:t>sarowliu#sohu-inc.com</a:t>
+            </a:r>
+            <a:r>
+              <a:rPr lang="en-US" altLang="zh-CN" dirty="0" smtClean="0"/>
+              <a:t>  </a:t>
+            </a:r>
+            <a:br>
+              <a:rPr lang="en-US" altLang="zh-CN" dirty="0" smtClean="0"/>
+            </a:br>
+            <a:r>
+              <a:rPr lang="en-US" altLang="zh-CN" dirty="0" err="1" smtClean="0"/>
+              <a:t>guihualeng#sohu-inc.com</a:t>
+            </a:r>
+            <a:r>
+              <a:rPr lang="en-US" altLang="zh-CN" dirty="0" smtClean="0"/>
+              <a:t>  </a:t>
+            </a:r>
+            <a:endParaRPr lang="zh-CN" altLang="en-US" dirty="0"/>
+          </a:p>
+        </p:txBody>
+      </p:sp>
+      <p:sp>
+        <p:nvSpPr>
+          <p:cNvPr id="4" name="日期占位符 3"/>
+          <p:cNvSpPr>
+            <a:spLocks noGrp="1"/>
+          </p:cNvSpPr>
+          <p:nvPr>
+            <p:ph type="dt" sz="half" idx="10"/>
+          </p:nvPr>
+        </p:nvSpPr>
+        <p:spPr/>
+        <p:txBody>
+          <a:bodyPr/>
+          <a:lstStyle/>
+          <a:p>
+            <a:r>
+              <a:rPr lang="en-US" altLang="zh-CN" smtClean="0"/>
+              <a:t>2015/4/7</a:t>
+            </a:r>
+            <a:endParaRPr lang="zh-CN" altLang="en-US"/>
+          </a:p>
+        </p:txBody>
+      </p:sp>
+      <p:sp>
+        <p:nvSpPr>
+          <p:cNvPr id="5" name="页脚占位符 4"/>
+          <p:cNvSpPr>
+            <a:spLocks noGrp="1"/>
+          </p:cNvSpPr>
+          <p:nvPr>
+            <p:ph type="ftr" sz="quarter" idx="11"/>
+          </p:nvPr>
+        </p:nvSpPr>
+        <p:spPr/>
+        <p:txBody>
+          <a:bodyPr/>
+          <a:lstStyle/>
+          <a:p>
+            <a:r>
+              <a:rPr lang="zh-CN" altLang="en-US" smtClean="0"/>
+              <a:t>朱涛</a:t>
+            </a:r>
+            <a:endParaRPr lang="zh-CN" altLang="en-US"/>
+          </a:p>
+        </p:txBody>
+      </p:sp>
+    </p:spTree>
+  </p:cSld>
+  <p:clrMapOvr>
+    <a:masterClrMapping/>
+  </p:clrMapOvr>
 </p:sld>
 </file>
 

</xml_diff>